<commit_message>
Admin Panel Created, Scss styles made
</commit_message>
<xml_diff>
--- a/pollfoxy_Schema.pptx
+++ b/pollfoxy_Schema.pptx
@@ -292,7 +292,7 @@
           <a:p>
             <a:fld id="{00DCA811-498F-4F4B-B1A4-7E102CA0A5B8}" type="datetimeFigureOut">
               <a:rPr lang="ru-RU" smtClean="0"/>
-              <a:t>26.03.2019</a:t>
+              <a:t>12.05.2019</a:t>
             </a:fld>
             <a:endParaRPr lang="ru-RU"/>
           </a:p>
@@ -462,7 +462,7 @@
           <a:p>
             <a:fld id="{00DCA811-498F-4F4B-B1A4-7E102CA0A5B8}" type="datetimeFigureOut">
               <a:rPr lang="ru-RU" smtClean="0"/>
-              <a:t>26.03.2019</a:t>
+              <a:t>12.05.2019</a:t>
             </a:fld>
             <a:endParaRPr lang="ru-RU"/>
           </a:p>
@@ -642,7 +642,7 @@
           <a:p>
             <a:fld id="{00DCA811-498F-4F4B-B1A4-7E102CA0A5B8}" type="datetimeFigureOut">
               <a:rPr lang="ru-RU" smtClean="0"/>
-              <a:t>26.03.2019</a:t>
+              <a:t>12.05.2019</a:t>
             </a:fld>
             <a:endParaRPr lang="ru-RU"/>
           </a:p>
@@ -812,7 +812,7 @@
           <a:p>
             <a:fld id="{00DCA811-498F-4F4B-B1A4-7E102CA0A5B8}" type="datetimeFigureOut">
               <a:rPr lang="ru-RU" smtClean="0"/>
-              <a:t>26.03.2019</a:t>
+              <a:t>12.05.2019</a:t>
             </a:fld>
             <a:endParaRPr lang="ru-RU"/>
           </a:p>
@@ -1058,7 +1058,7 @@
           <a:p>
             <a:fld id="{00DCA811-498F-4F4B-B1A4-7E102CA0A5B8}" type="datetimeFigureOut">
               <a:rPr lang="ru-RU" smtClean="0"/>
-              <a:t>26.03.2019</a:t>
+              <a:t>12.05.2019</a:t>
             </a:fld>
             <a:endParaRPr lang="ru-RU"/>
           </a:p>
@@ -1346,7 +1346,7 @@
           <a:p>
             <a:fld id="{00DCA811-498F-4F4B-B1A4-7E102CA0A5B8}" type="datetimeFigureOut">
               <a:rPr lang="ru-RU" smtClean="0"/>
-              <a:t>26.03.2019</a:t>
+              <a:t>12.05.2019</a:t>
             </a:fld>
             <a:endParaRPr lang="ru-RU"/>
           </a:p>
@@ -1768,7 +1768,7 @@
           <a:p>
             <a:fld id="{00DCA811-498F-4F4B-B1A4-7E102CA0A5B8}" type="datetimeFigureOut">
               <a:rPr lang="ru-RU" smtClean="0"/>
-              <a:t>26.03.2019</a:t>
+              <a:t>12.05.2019</a:t>
             </a:fld>
             <a:endParaRPr lang="ru-RU"/>
           </a:p>
@@ -1886,7 +1886,7 @@
           <a:p>
             <a:fld id="{00DCA811-498F-4F4B-B1A4-7E102CA0A5B8}" type="datetimeFigureOut">
               <a:rPr lang="ru-RU" smtClean="0"/>
-              <a:t>26.03.2019</a:t>
+              <a:t>12.05.2019</a:t>
             </a:fld>
             <a:endParaRPr lang="ru-RU"/>
           </a:p>
@@ -1981,7 +1981,7 @@
           <a:p>
             <a:fld id="{00DCA811-498F-4F4B-B1A4-7E102CA0A5B8}" type="datetimeFigureOut">
               <a:rPr lang="ru-RU" smtClean="0"/>
-              <a:t>26.03.2019</a:t>
+              <a:t>12.05.2019</a:t>
             </a:fld>
             <a:endParaRPr lang="ru-RU"/>
           </a:p>
@@ -2258,7 +2258,7 @@
           <a:p>
             <a:fld id="{00DCA811-498F-4F4B-B1A4-7E102CA0A5B8}" type="datetimeFigureOut">
               <a:rPr lang="ru-RU" smtClean="0"/>
-              <a:t>26.03.2019</a:t>
+              <a:t>12.05.2019</a:t>
             </a:fld>
             <a:endParaRPr lang="ru-RU"/>
           </a:p>
@@ -2511,7 +2511,7 @@
           <a:p>
             <a:fld id="{00DCA811-498F-4F4B-B1A4-7E102CA0A5B8}" type="datetimeFigureOut">
               <a:rPr lang="ru-RU" smtClean="0"/>
-              <a:t>26.03.2019</a:t>
+              <a:t>12.05.2019</a:t>
             </a:fld>
             <a:endParaRPr lang="ru-RU"/>
           </a:p>
@@ -2724,7 +2724,7 @@
           <a:p>
             <a:fld id="{00DCA811-498F-4F4B-B1A4-7E102CA0A5B8}" type="datetimeFigureOut">
               <a:rPr lang="ru-RU" smtClean="0"/>
-              <a:t>26.03.2019</a:t>
+              <a:t>12.05.2019</a:t>
             </a:fld>
             <a:endParaRPr lang="ru-RU"/>
           </a:p>
@@ -3294,10 +3294,7 @@
           <a:lstStyle/>
           <a:p>
             <a:pPr algn="ctr"/>
-            <a:r>
-              <a:rPr lang="en-US" dirty="0" smtClean="0"/>
-              <a:t>main.js</a:t>
-            </a:r>
+            <a:endParaRPr lang="en-US" dirty="0" smtClean="0"/>
           </a:p>
         </p:txBody>
       </p:sp>
@@ -4075,11 +4072,7 @@
             </a:r>
             <a:r>
               <a:rPr lang="en-US" dirty="0" smtClean="0"/>
-              <a:t>poll</a:t>
-            </a:r>
-            <a:r>
-              <a:rPr lang="en-US" dirty="0" smtClean="0"/>
-              <a:t>.js</a:t>
+              <a:t>poll.js</a:t>
             </a:r>
             <a:r>
               <a:rPr lang="ru-RU" dirty="0" smtClean="0"/>

</xml_diff>